<commit_message>
Revert "Revert "문서작성 및 에셋 추가""
</commit_message>
<xml_diff>
--- a/기획서/문서/UI 기획.pptx
+++ b/기획서/문서/UI 기획.pptx
@@ -5,19 +5,20 @@
     <p:sldMasterId id="2147483684" r:id="rId1"/>
   </p:sldMasterIdLst>
   <p:notesMasterIdLst>
-    <p:notesMasterId r:id="rId9"/>
+    <p:notesMasterId r:id="rId10"/>
   </p:notesMasterIdLst>
   <p:handoutMasterIdLst>
-    <p:handoutMasterId r:id="rId10"/>
+    <p:handoutMasterId r:id="rId11"/>
   </p:handoutMasterIdLst>
   <p:sldIdLst>
     <p:sldId id="256" r:id="rId2"/>
     <p:sldId id="257" r:id="rId3"/>
     <p:sldId id="258" r:id="rId4"/>
-    <p:sldId id="259" r:id="rId5"/>
+    <p:sldId id="263" r:id="rId5"/>
     <p:sldId id="260" r:id="rId6"/>
-    <p:sldId id="261" r:id="rId7"/>
-    <p:sldId id="262" r:id="rId8"/>
+    <p:sldId id="264" r:id="rId7"/>
+    <p:sldId id="261" r:id="rId8"/>
+    <p:sldId id="262" r:id="rId9"/>
   </p:sldIdLst>
   <p:sldSz cx="17610138" cy="9906000"/>
   <p:notesSz cx="6858000" cy="9144000"/>
@@ -218,7 +219,7 @@
           <a:p>
             <a:fld id="{D686C50E-113A-4B4A-8A5C-9EE1E9DBA064}" type="datetimeFigureOut">
               <a:rPr lang="ko-KR" altLang="en-US" smtClean="0"/>
-              <a:t>2021-05-26</a:t>
+              <a:t>2021-05-30</a:t>
             </a:fld>
             <a:endParaRPr lang="ko-KR" altLang="en-US" dirty="0"/>
           </a:p>
@@ -395,7 +396,7 @@
           <a:p>
             <a:fld id="{40EC3B2E-CA71-40FC-A78E-FA212ABD0BB7}" type="datetimeFigureOut">
               <a:rPr lang="ko-KR" altLang="en-US" smtClean="0"/>
-              <a:t>2021-05-26</a:t>
+              <a:t>2021-05-30</a:t>
             </a:fld>
             <a:endParaRPr lang="ko-KR" altLang="en-US" dirty="0"/>
           </a:p>
@@ -746,6 +747,90 @@
 </p:notes>
 </file>
 
+<file path=ppt/notesSlides/notesSlide2.xml><?xml version="1.0" encoding="utf-8"?>
+<p:notes xmlns:a="http://schemas.openxmlformats.org/drawingml/2006/main" xmlns:r="http://schemas.openxmlformats.org/officeDocument/2006/relationships" xmlns:p="http://schemas.openxmlformats.org/presentationml/2006/main">
+  <p:cSld>
+    <p:spTree>
+      <p:nvGrpSpPr>
+        <p:cNvPr id="1" name=""/>
+        <p:cNvGrpSpPr/>
+        <p:nvPr/>
+      </p:nvGrpSpPr>
+      <p:grpSpPr>
+        <a:xfrm>
+          <a:off x="0" y="0"/>
+          <a:ext cx="0" cy="0"/>
+          <a:chOff x="0" y="0"/>
+          <a:chExt cx="0" cy="0"/>
+        </a:xfrm>
+      </p:grpSpPr>
+      <p:sp>
+        <p:nvSpPr>
+          <p:cNvPr id="2" name="슬라이드 이미지 개체 틀 1"/>
+          <p:cNvSpPr>
+            <a:spLocks noGrp="1" noRot="1" noChangeAspect="1"/>
+          </p:cNvSpPr>
+          <p:nvPr>
+            <p:ph type="sldImg"/>
+          </p:nvPr>
+        </p:nvSpPr>
+        <p:spPr/>
+      </p:sp>
+      <p:sp>
+        <p:nvSpPr>
+          <p:cNvPr id="3" name="슬라이드 노트 개체 틀 2"/>
+          <p:cNvSpPr>
+            <a:spLocks noGrp="1"/>
+          </p:cNvSpPr>
+          <p:nvPr>
+            <p:ph type="body" idx="1"/>
+          </p:nvPr>
+        </p:nvSpPr>
+        <p:spPr/>
+        <p:txBody>
+          <a:bodyPr/>
+          <a:lstStyle/>
+          <a:p>
+            <a:endParaRPr lang="ko-KR" altLang="en-US" dirty="0"/>
+          </a:p>
+        </p:txBody>
+      </p:sp>
+      <p:sp>
+        <p:nvSpPr>
+          <p:cNvPr id="4" name="슬라이드 번호 개체 틀 3"/>
+          <p:cNvSpPr>
+            <a:spLocks noGrp="1"/>
+          </p:cNvSpPr>
+          <p:nvPr>
+            <p:ph type="sldNum" sz="quarter" idx="5"/>
+          </p:nvPr>
+        </p:nvSpPr>
+        <p:spPr/>
+        <p:txBody>
+          <a:bodyPr/>
+          <a:lstStyle/>
+          <a:p>
+            <a:fld id="{BC06C371-76E4-4FFF-ADC5-B5CD44D9DB07}" type="slidenum">
+              <a:rPr lang="ko-KR" altLang="en-US" smtClean="0"/>
+              <a:t>6</a:t>
+            </a:fld>
+            <a:endParaRPr lang="ko-KR" altLang="en-US" dirty="0"/>
+          </a:p>
+        </p:txBody>
+      </p:sp>
+    </p:spTree>
+    <p:extLst>
+      <p:ext uri="{BB962C8B-B14F-4D97-AF65-F5344CB8AC3E}">
+        <p14:creationId xmlns:p14="http://schemas.microsoft.com/office/powerpoint/2010/main" val="2237915871"/>
+      </p:ext>
+    </p:extLst>
+  </p:cSld>
+  <p:clrMapOvr>
+    <a:masterClrMapping/>
+  </p:clrMapOvr>
+</p:notes>
+</file>
+
 <file path=ppt/slideLayouts/slideLayout1.xml><?xml version="1.0" encoding="utf-8"?>
 <p:sldLayout xmlns:a="http://schemas.openxmlformats.org/drawingml/2006/main" xmlns:r="http://schemas.openxmlformats.org/officeDocument/2006/relationships" xmlns:p="http://schemas.openxmlformats.org/presentationml/2006/main" type="title" preserve="1">
   <p:cSld name="제목 슬라이드">
@@ -877,7 +962,7 @@
           <a:p>
             <a:fld id="{F8CAAD71-D53C-4447-AAA3-BC9075A67E69}" type="datetimeFigureOut">
               <a:rPr lang="ko-KR" altLang="en-US" smtClean="0"/>
-              <a:t>2021-05-26</a:t>
+              <a:t>2021-05-30</a:t>
             </a:fld>
             <a:endParaRPr lang="ko-KR" altLang="en-US" dirty="0"/>
           </a:p>
@@ -1047,7 +1132,7 @@
           <a:p>
             <a:fld id="{F8CAAD71-D53C-4447-AAA3-BC9075A67E69}" type="datetimeFigureOut">
               <a:rPr lang="ko-KR" altLang="en-US" smtClean="0"/>
-              <a:t>2021-05-26</a:t>
+              <a:t>2021-05-30</a:t>
             </a:fld>
             <a:endParaRPr lang="ko-KR" altLang="en-US" dirty="0"/>
           </a:p>
@@ -1227,7 +1312,7 @@
           <a:p>
             <a:fld id="{F8CAAD71-D53C-4447-AAA3-BC9075A67E69}" type="datetimeFigureOut">
               <a:rPr lang="ko-KR" altLang="en-US" smtClean="0"/>
-              <a:t>2021-05-26</a:t>
+              <a:t>2021-05-30</a:t>
             </a:fld>
             <a:endParaRPr lang="ko-KR" altLang="en-US" dirty="0"/>
           </a:p>
@@ -1397,7 +1482,7 @@
           <a:p>
             <a:fld id="{F8CAAD71-D53C-4447-AAA3-BC9075A67E69}" type="datetimeFigureOut">
               <a:rPr lang="ko-KR" altLang="en-US" smtClean="0"/>
-              <a:t>2021-05-26</a:t>
+              <a:t>2021-05-30</a:t>
             </a:fld>
             <a:endParaRPr lang="ko-KR" altLang="en-US" dirty="0"/>
           </a:p>
@@ -1643,7 +1728,7 @@
           <a:p>
             <a:fld id="{F8CAAD71-D53C-4447-AAA3-BC9075A67E69}" type="datetimeFigureOut">
               <a:rPr lang="ko-KR" altLang="en-US" smtClean="0"/>
-              <a:t>2021-05-26</a:t>
+              <a:t>2021-05-30</a:t>
             </a:fld>
             <a:endParaRPr lang="ko-KR" altLang="en-US" dirty="0"/>
           </a:p>
@@ -1875,7 +1960,7 @@
           <a:p>
             <a:fld id="{F8CAAD71-D53C-4447-AAA3-BC9075A67E69}" type="datetimeFigureOut">
               <a:rPr lang="ko-KR" altLang="en-US" smtClean="0"/>
-              <a:t>2021-05-26</a:t>
+              <a:t>2021-05-30</a:t>
             </a:fld>
             <a:endParaRPr lang="ko-KR" altLang="en-US" dirty="0"/>
           </a:p>
@@ -2242,7 +2327,7 @@
           <a:p>
             <a:fld id="{F8CAAD71-D53C-4447-AAA3-BC9075A67E69}" type="datetimeFigureOut">
               <a:rPr lang="ko-KR" altLang="en-US" smtClean="0"/>
-              <a:t>2021-05-26</a:t>
+              <a:t>2021-05-30</a:t>
             </a:fld>
             <a:endParaRPr lang="ko-KR" altLang="en-US" dirty="0"/>
           </a:p>
@@ -2360,7 +2445,7 @@
           <a:p>
             <a:fld id="{F8CAAD71-D53C-4447-AAA3-BC9075A67E69}" type="datetimeFigureOut">
               <a:rPr lang="ko-KR" altLang="en-US" smtClean="0"/>
-              <a:t>2021-05-26</a:t>
+              <a:t>2021-05-30</a:t>
             </a:fld>
             <a:endParaRPr lang="ko-KR" altLang="en-US" dirty="0"/>
           </a:p>
@@ -2455,7 +2540,7 @@
           <a:p>
             <a:fld id="{F8CAAD71-D53C-4447-AAA3-BC9075A67E69}" type="datetimeFigureOut">
               <a:rPr lang="ko-KR" altLang="en-US" smtClean="0"/>
-              <a:t>2021-05-26</a:t>
+              <a:t>2021-05-30</a:t>
             </a:fld>
             <a:endParaRPr lang="ko-KR" altLang="en-US" dirty="0"/>
           </a:p>
@@ -2732,7 +2817,7 @@
           <a:p>
             <a:fld id="{F8CAAD71-D53C-4447-AAA3-BC9075A67E69}" type="datetimeFigureOut">
               <a:rPr lang="ko-KR" altLang="en-US" smtClean="0"/>
-              <a:t>2021-05-26</a:t>
+              <a:t>2021-05-30</a:t>
             </a:fld>
             <a:endParaRPr lang="ko-KR" altLang="en-US" dirty="0"/>
           </a:p>
@@ -2989,7 +3074,7 @@
           <a:p>
             <a:fld id="{F8CAAD71-D53C-4447-AAA3-BC9075A67E69}" type="datetimeFigureOut">
               <a:rPr lang="ko-KR" altLang="en-US" smtClean="0"/>
-              <a:t>2021-05-26</a:t>
+              <a:t>2021-05-30</a:t>
             </a:fld>
             <a:endParaRPr lang="ko-KR" altLang="en-US" dirty="0"/>
           </a:p>
@@ -3207,7 +3292,7 @@
           <a:p>
             <a:fld id="{F8CAAD71-D53C-4447-AAA3-BC9075A67E69}" type="datetimeFigureOut">
               <a:rPr lang="ko-KR" altLang="en-US" smtClean="0"/>
-              <a:t>2021-05-26</a:t>
+              <a:t>2021-05-30</a:t>
             </a:fld>
             <a:endParaRPr lang="ko-KR" altLang="en-US" dirty="0"/>
           </a:p>
@@ -3874,7 +3959,7 @@
         <p:spPr>
           <a:xfrm>
             <a:off x="445276" y="1697447"/>
-            <a:ext cx="14680424" cy="2236959"/>
+            <a:ext cx="14680424" cy="2790957"/>
           </a:xfrm>
           <a:prstGeom prst="rect">
             <a:avLst/>
@@ -3919,6 +4004,16 @@
               <a:buAutoNum type="arabicPeriod"/>
             </a:pPr>
             <a:r>
+              <a:rPr lang="ko-KR" altLang="en-US" sz="2400" b="1" dirty="0">
+                <a:solidFill>
+                  <a:schemeClr val="bg1"/>
+                </a:solidFill>
+                <a:latin typeface="+mj-ea"/>
+                <a:ea typeface="+mj-ea"/>
+              </a:rPr>
+              <a:t>기본 </a:t>
+            </a:r>
+            <a:r>
               <a:rPr lang="ko-KR" altLang="en-US" sz="2400" b="1" dirty="0" err="1">
                 <a:solidFill>
                   <a:schemeClr val="bg1"/>
@@ -3972,6 +4067,74 @@
                 <a:ea typeface="+mj-ea"/>
               </a:rPr>
               <a:t> </a:t>
+            </a:r>
+            <a:r>
+              <a:rPr lang="en-US" altLang="ko-KR" sz="2400" b="1" dirty="0">
+                <a:solidFill>
+                  <a:schemeClr val="bg1"/>
+                </a:solidFill>
+                <a:latin typeface="+mj-ea"/>
+                <a:ea typeface="+mj-ea"/>
+              </a:rPr>
+              <a:t>UI</a:t>
+            </a:r>
+            <a:r>
+              <a:rPr lang="ko-KR" altLang="en-US" sz="2400" b="1" dirty="0">
+                <a:solidFill>
+                  <a:schemeClr val="bg1"/>
+                </a:solidFill>
+                <a:latin typeface="+mj-ea"/>
+                <a:ea typeface="+mj-ea"/>
+              </a:rPr>
+              <a:t>규격 </a:t>
+            </a:r>
+            <a:r>
+              <a:rPr lang="en-US" altLang="ko-KR" sz="2400" b="1" dirty="0">
+                <a:solidFill>
+                  <a:schemeClr val="bg1"/>
+                </a:solidFill>
+                <a:latin typeface="+mj-ea"/>
+                <a:ea typeface="+mj-ea"/>
+              </a:rPr>
+              <a:t>(1920X1080 </a:t>
+            </a:r>
+            <a:r>
+              <a:rPr lang="ko-KR" altLang="en-US" sz="2400" b="1" dirty="0">
+                <a:solidFill>
+                  <a:schemeClr val="bg1"/>
+                </a:solidFill>
+                <a:latin typeface="+mj-ea"/>
+                <a:ea typeface="+mj-ea"/>
+              </a:rPr>
+              <a:t>기준</a:t>
+            </a:r>
+            <a:r>
+              <a:rPr lang="en-US" altLang="ko-KR" sz="2400" b="1" dirty="0">
+                <a:solidFill>
+                  <a:schemeClr val="bg1"/>
+                </a:solidFill>
+                <a:latin typeface="+mj-ea"/>
+                <a:ea typeface="+mj-ea"/>
+              </a:rPr>
+              <a:t>)</a:t>
+            </a:r>
+          </a:p>
+          <a:p>
+            <a:pPr marL="342900" indent="-342900">
+              <a:lnSpc>
+                <a:spcPct val="150000"/>
+              </a:lnSpc>
+              <a:buAutoNum type="arabicPeriod"/>
+            </a:pPr>
+            <a:r>
+              <a:rPr lang="ko-KR" altLang="en-US" sz="2400" b="1" dirty="0">
+                <a:solidFill>
+                  <a:schemeClr val="bg1"/>
+                </a:solidFill>
+                <a:latin typeface="+mj-ea"/>
+                <a:ea typeface="+mj-ea"/>
+              </a:rPr>
+              <a:t>이벤트 </a:t>
             </a:r>
             <a:r>
               <a:rPr lang="en-US" altLang="ko-KR" sz="2400" b="1" dirty="0">
@@ -5098,6 +5261,13 @@
           <a:p>
             <a:pPr algn="ctr"/>
             <a:r>
+              <a:rPr lang="ko-KR" altLang="en-US" b="1" dirty="0">
+                <a:latin typeface="메이플스토리" panose="02000300000000000000" pitchFamily="2" charset="-127"/>
+                <a:ea typeface="메이플스토리" panose="02000300000000000000" pitchFamily="2" charset="-127"/>
+              </a:rPr>
+              <a:t>기본 </a:t>
+            </a:r>
+            <a:r>
               <a:rPr lang="ko-KR" altLang="en-US" b="1" dirty="0" err="1">
                 <a:latin typeface="메이플스토리" panose="02000300000000000000" pitchFamily="2" charset="-127"/>
                 <a:ea typeface="메이플스토리" panose="02000300000000000000" pitchFamily="2" charset="-127"/>
@@ -5126,13 +5296,7 @@
           <p:cNvGraphicFramePr>
             <a:graphicFrameLocks noGrp="1"/>
           </p:cNvGraphicFramePr>
-          <p:nvPr>
-            <p:extLst>
-              <p:ext uri="{D42A27DB-BD31-4B8C-83A1-F6EECF244321}">
-                <p14:modId xmlns:p14="http://schemas.microsoft.com/office/powerpoint/2010/main" val="49077710"/>
-              </p:ext>
-            </p:extLst>
-          </p:nvPr>
+          <p:nvPr/>
         </p:nvGraphicFramePr>
         <p:xfrm>
           <a:off x="11792313" y="1430919"/>
@@ -6281,7 +6445,7 @@
     </p:spTree>
     <p:extLst>
       <p:ext uri="{BB962C8B-B14F-4D97-AF65-F5344CB8AC3E}">
-        <p14:creationId xmlns:p14="http://schemas.microsoft.com/office/powerpoint/2010/main" val="3271959534"/>
+        <p14:creationId xmlns:p14="http://schemas.microsoft.com/office/powerpoint/2010/main" val="1182800998"/>
       </p:ext>
     </p:extLst>
   </p:cSld>
@@ -6621,6 +6785,13 @@
           <a:p>
             <a:pPr algn="ctr"/>
             <a:r>
+              <a:rPr lang="ko-KR" altLang="en-US" b="1" dirty="0">
+                <a:latin typeface="메이플스토리" panose="02000300000000000000" pitchFamily="2" charset="-127"/>
+                <a:ea typeface="메이플스토리" panose="02000300000000000000" pitchFamily="2" charset="-127"/>
+              </a:rPr>
+              <a:t>기본 </a:t>
+            </a:r>
+            <a:r>
               <a:rPr lang="ko-KR" altLang="en-US" b="1" dirty="0" err="1">
                 <a:latin typeface="메이플스토리" panose="02000300000000000000" pitchFamily="2" charset="-127"/>
                 <a:ea typeface="메이플스토리" panose="02000300000000000000" pitchFamily="2" charset="-127"/>
@@ -6691,14 +6862,14 @@
           <p:nvPr>
             <p:extLst>
               <p:ext uri="{D42A27DB-BD31-4B8C-83A1-F6EECF244321}">
-                <p14:modId xmlns:p14="http://schemas.microsoft.com/office/powerpoint/2010/main" val="393131965"/>
+                <p14:modId xmlns:p14="http://schemas.microsoft.com/office/powerpoint/2010/main" val="2017534911"/>
               </p:ext>
             </p:extLst>
           </p:nvPr>
         </p:nvGraphicFramePr>
         <p:xfrm>
           <a:off x="11792313" y="1430919"/>
-          <a:ext cx="5716224" cy="1729160"/>
+          <a:ext cx="5716224" cy="1383328"/>
         </p:xfrm>
         <a:graphic>
           <a:graphicData uri="http://schemas.openxmlformats.org/drawingml/2006/table">
@@ -6930,50 +7101,6 @@
                 <a:extLst>
                   <a:ext uri="{0D108BD9-81ED-4DB2-BD59-A6C34878D82A}">
                     <a16:rowId xmlns:a16="http://schemas.microsoft.com/office/drawing/2014/main" val="277991780"/>
-                  </a:ext>
-                </a:extLst>
-              </a:tr>
-              <a:tr h="345832">
-                <a:tc>
-                  <a:txBody>
-                    <a:bodyPr/>
-                    <a:lstStyle/>
-                    <a:p>
-                      <a:pPr algn="ctr" latinLnBrk="1"/>
-                      <a:r>
-                        <a:rPr lang="ko-KR" altLang="en-US" sz="1600" dirty="0"/>
-                        <a:t>⑤</a:t>
-                      </a:r>
-                    </a:p>
-                  </a:txBody>
-                  <a:tcPr anchor="ctr">
-                    <a:solidFill>
-                      <a:schemeClr val="bg1"/>
-                    </a:solidFill>
-                  </a:tcPr>
-                </a:tc>
-                <a:tc>
-                  <a:txBody>
-                    <a:bodyPr/>
-                    <a:lstStyle/>
-                    <a:p>
-                      <a:pPr algn="ctr" latinLnBrk="1"/>
-                      <a:endParaRPr lang="en-US" altLang="ko-KR" sz="1600" i="0" dirty="0">
-                        <a:solidFill>
-                          <a:schemeClr val="tx1"/>
-                        </a:solidFill>
-                      </a:endParaRPr>
-                    </a:p>
-                  </a:txBody>
-                  <a:tcPr anchor="ctr">
-                    <a:solidFill>
-                      <a:schemeClr val="bg1"/>
-                    </a:solidFill>
-                  </a:tcPr>
-                </a:tc>
-                <a:extLst>
-                  <a:ext uri="{0D108BD9-81ED-4DB2-BD59-A6C34878D82A}">
-                    <a16:rowId xmlns:a16="http://schemas.microsoft.com/office/drawing/2014/main" val="2894574746"/>
                   </a:ext>
                 </a:extLst>
               </a:tr>
@@ -9393,6 +9520,1655 @@
       </p:grpSpPr>
       <p:sp>
         <p:nvSpPr>
+          <p:cNvPr id="113" name="직사각형 112">
+            <a:extLst>
+              <a:ext uri="{FF2B5EF4-FFF2-40B4-BE49-F238E27FC236}">
+                <a16:creationId xmlns:a16="http://schemas.microsoft.com/office/drawing/2014/main" id="{36B2FA93-36D2-4209-A814-C4FAB7B84721}"/>
+              </a:ext>
+            </a:extLst>
+          </p:cNvPr>
+          <p:cNvSpPr/>
+          <p:nvPr/>
+        </p:nvSpPr>
+        <p:spPr>
+          <a:xfrm>
+            <a:off x="159963" y="7953794"/>
+            <a:ext cx="11520000" cy="1942032"/>
+          </a:xfrm>
+          <a:prstGeom prst="rect">
+            <a:avLst/>
+          </a:prstGeom>
+          <a:solidFill>
+            <a:schemeClr val="bg1">
+              <a:alpha val="20000"/>
+            </a:schemeClr>
+          </a:solidFill>
+          <a:ln>
+            <a:solidFill>
+              <a:schemeClr val="bg1"/>
+            </a:solidFill>
+          </a:ln>
+        </p:spPr>
+        <p:style>
+          <a:lnRef idx="2">
+            <a:schemeClr val="accent1">
+              <a:shade val="50000"/>
+            </a:schemeClr>
+          </a:lnRef>
+          <a:fillRef idx="1">
+            <a:schemeClr val="accent1"/>
+          </a:fillRef>
+          <a:effectRef idx="0">
+            <a:schemeClr val="accent1"/>
+          </a:effectRef>
+          <a:fontRef idx="minor">
+            <a:schemeClr val="lt1"/>
+          </a:fontRef>
+        </p:style>
+        <p:txBody>
+          <a:bodyPr rtlCol="0" anchor="ctr"/>
+          <a:lstStyle/>
+          <a:p>
+            <a:pPr algn="ctr"/>
+            <a:endParaRPr lang="ko-KR" altLang="en-US" dirty="0"/>
+          </a:p>
+        </p:txBody>
+      </p:sp>
+      <p:sp>
+        <p:nvSpPr>
+          <p:cNvPr id="4" name="직사각형 3">
+            <a:extLst>
+              <a:ext uri="{FF2B5EF4-FFF2-40B4-BE49-F238E27FC236}">
+                <a16:creationId xmlns:a16="http://schemas.microsoft.com/office/drawing/2014/main" id="{E4BF6550-25AC-4728-8037-519A816C0EB1}"/>
+              </a:ext>
+            </a:extLst>
+          </p:cNvPr>
+          <p:cNvSpPr/>
+          <p:nvPr/>
+        </p:nvSpPr>
+        <p:spPr>
+          <a:xfrm>
+            <a:off x="8132804" y="33681"/>
+            <a:ext cx="1344535" cy="923330"/>
+          </a:xfrm>
+          <a:prstGeom prst="rect">
+            <a:avLst/>
+          </a:prstGeom>
+          <a:noFill/>
+        </p:spPr>
+        <p:txBody>
+          <a:bodyPr wrap="none" lIns="91440" tIns="45720" rIns="91440" bIns="45720">
+            <a:spAutoFit/>
+          </a:bodyPr>
+          <a:lstStyle/>
+          <a:p>
+            <a:pPr algn="ctr"/>
+            <a:r>
+              <a:rPr lang="en-US" altLang="ko-KR" sz="5400" b="1" dirty="0">
+                <a:ln w="0">
+                  <a:solidFill>
+                    <a:schemeClr val="bg1"/>
+                  </a:solidFill>
+                </a:ln>
+                <a:latin typeface="+mj-ea"/>
+                <a:ea typeface="+mj-ea"/>
+              </a:rPr>
+              <a:t>WA</a:t>
+            </a:r>
+          </a:p>
+        </p:txBody>
+      </p:sp>
+      <p:sp>
+        <p:nvSpPr>
+          <p:cNvPr id="5" name="사각형: 둥근 모서리 4">
+            <a:extLst>
+              <a:ext uri="{FF2B5EF4-FFF2-40B4-BE49-F238E27FC236}">
+                <a16:creationId xmlns:a16="http://schemas.microsoft.com/office/drawing/2014/main" id="{284673F5-C4AE-453A-95F6-C66F5BC52C33}"/>
+              </a:ext>
+            </a:extLst>
+          </p:cNvPr>
+          <p:cNvSpPr/>
+          <p:nvPr/>
+        </p:nvSpPr>
+        <p:spPr>
+          <a:xfrm>
+            <a:off x="101601" y="993855"/>
+            <a:ext cx="17406942" cy="318170"/>
+          </a:xfrm>
+          <a:prstGeom prst="roundRect">
+            <a:avLst/>
+          </a:prstGeom>
+          <a:solidFill>
+            <a:schemeClr val="tx1"/>
+          </a:solidFill>
+          <a:ln>
+            <a:noFill/>
+          </a:ln>
+        </p:spPr>
+        <p:style>
+          <a:lnRef idx="2">
+            <a:schemeClr val="accent1">
+              <a:shade val="50000"/>
+            </a:schemeClr>
+          </a:lnRef>
+          <a:fillRef idx="1">
+            <a:schemeClr val="accent1"/>
+          </a:fillRef>
+          <a:effectRef idx="0">
+            <a:schemeClr val="accent1"/>
+          </a:effectRef>
+          <a:fontRef idx="minor">
+            <a:schemeClr val="lt1"/>
+          </a:fontRef>
+        </p:style>
+        <p:txBody>
+          <a:bodyPr rtlCol="0" anchor="ctr"/>
+          <a:lstStyle/>
+          <a:p>
+            <a:pPr algn="ctr"/>
+            <a:r>
+              <a:rPr lang="ko-KR" altLang="en-US" b="1" dirty="0">
+                <a:latin typeface="메이플스토리" panose="02000300000000000000" pitchFamily="2" charset="-127"/>
+                <a:ea typeface="메이플스토리" panose="02000300000000000000" pitchFamily="2" charset="-127"/>
+              </a:rPr>
+              <a:t>이벤트 </a:t>
+            </a:r>
+            <a:r>
+              <a:rPr lang="en-US" altLang="ko-KR" b="1" dirty="0">
+                <a:latin typeface="메이플스토리" panose="02000300000000000000" pitchFamily="2" charset="-127"/>
+                <a:ea typeface="메이플스토리" panose="02000300000000000000" pitchFamily="2" charset="-127"/>
+              </a:rPr>
+              <a:t>UI</a:t>
+            </a:r>
+            <a:r>
+              <a:rPr lang="ko-KR" altLang="en-US" b="1" dirty="0">
+                <a:latin typeface="메이플스토리" panose="02000300000000000000" pitchFamily="2" charset="-127"/>
+                <a:ea typeface="메이플스토리" panose="02000300000000000000" pitchFamily="2" charset="-127"/>
+              </a:rPr>
+              <a:t>규격 </a:t>
+            </a:r>
+            <a:r>
+              <a:rPr lang="en-US" altLang="ko-KR" b="1" dirty="0">
+                <a:latin typeface="메이플스토리" panose="02000300000000000000" pitchFamily="2" charset="-127"/>
+                <a:ea typeface="메이플스토리" panose="02000300000000000000" pitchFamily="2" charset="-127"/>
+              </a:rPr>
+              <a:t>(1920x1080 </a:t>
+            </a:r>
+            <a:r>
+              <a:rPr lang="ko-KR" altLang="en-US" b="1" dirty="0">
+                <a:latin typeface="메이플스토리" panose="02000300000000000000" pitchFamily="2" charset="-127"/>
+                <a:ea typeface="메이플스토리" panose="02000300000000000000" pitchFamily="2" charset="-127"/>
+              </a:rPr>
+              <a:t>기준</a:t>
+            </a:r>
+            <a:r>
+              <a:rPr lang="en-US" altLang="ko-KR" b="1" dirty="0">
+                <a:latin typeface="메이플스토리" panose="02000300000000000000" pitchFamily="2" charset="-127"/>
+                <a:ea typeface="메이플스토리" panose="02000300000000000000" pitchFamily="2" charset="-127"/>
+              </a:rPr>
+              <a:t>)</a:t>
+            </a:r>
+            <a:endParaRPr lang="ko-KR" altLang="en-US" b="1" dirty="0">
+              <a:latin typeface="메이플스토리" panose="02000300000000000000" pitchFamily="2" charset="-127"/>
+              <a:ea typeface="메이플스토리" panose="02000300000000000000" pitchFamily="2" charset="-127"/>
+            </a:endParaRPr>
+          </a:p>
+        </p:txBody>
+      </p:sp>
+      <p:graphicFrame>
+        <p:nvGraphicFramePr>
+          <p:cNvPr id="29" name="표 34">
+            <a:extLst>
+              <a:ext uri="{FF2B5EF4-FFF2-40B4-BE49-F238E27FC236}">
+                <a16:creationId xmlns:a16="http://schemas.microsoft.com/office/drawing/2014/main" id="{B6745C71-9C72-4E6B-8D4D-5D39543EABDA}"/>
+              </a:ext>
+            </a:extLst>
+          </p:cNvPr>
+          <p:cNvGraphicFramePr>
+            <a:graphicFrameLocks noGrp="1"/>
+          </p:cNvGraphicFramePr>
+          <p:nvPr>
+            <p:extLst>
+              <p:ext uri="{D42A27DB-BD31-4B8C-83A1-F6EECF244321}">
+                <p14:modId xmlns:p14="http://schemas.microsoft.com/office/powerpoint/2010/main" val="836413617"/>
+              </p:ext>
+            </p:extLst>
+          </p:nvPr>
+        </p:nvGraphicFramePr>
+        <p:xfrm>
+          <a:off x="11792313" y="1430919"/>
+          <a:ext cx="5716224" cy="1729160"/>
+        </p:xfrm>
+        <a:graphic>
+          <a:graphicData uri="http://schemas.openxmlformats.org/drawingml/2006/table">
+            <a:tbl>
+              <a:tblPr firstRow="1" bandRow="1">
+                <a:tableStyleId>{5940675A-B579-460E-94D1-54222C63F5DA}</a:tableStyleId>
+              </a:tblPr>
+              <a:tblGrid>
+                <a:gridCol w="942189">
+                  <a:extLst>
+                    <a:ext uri="{9D8B030D-6E8A-4147-A177-3AD203B41FA5}">
+                      <a16:colId xmlns:a16="http://schemas.microsoft.com/office/drawing/2014/main" val="1091678528"/>
+                    </a:ext>
+                  </a:extLst>
+                </a:gridCol>
+                <a:gridCol w="4774035">
+                  <a:extLst>
+                    <a:ext uri="{9D8B030D-6E8A-4147-A177-3AD203B41FA5}">
+                      <a16:colId xmlns:a16="http://schemas.microsoft.com/office/drawing/2014/main" val="3645005055"/>
+                    </a:ext>
+                  </a:extLst>
+                </a:gridCol>
+              </a:tblGrid>
+              <a:tr h="345832">
+                <a:tc>
+                  <a:txBody>
+                    <a:bodyPr/>
+                    <a:lstStyle/>
+                    <a:p>
+                      <a:pPr algn="ctr" latinLnBrk="1"/>
+                      <a:r>
+                        <a:rPr lang="ko-KR" altLang="en-US" sz="1600" dirty="0"/>
+                        <a:t>①</a:t>
+                      </a:r>
+                    </a:p>
+                  </a:txBody>
+                  <a:tcPr anchor="ctr">
+                    <a:solidFill>
+                      <a:schemeClr val="bg1"/>
+                    </a:solidFill>
+                  </a:tcPr>
+                </a:tc>
+                <a:tc>
+                  <a:txBody>
+                    <a:bodyPr/>
+                    <a:lstStyle/>
+                    <a:p>
+                      <a:pPr algn="ctr" latinLnBrk="1"/>
+                      <a:r>
+                        <a:rPr lang="ko-KR" altLang="en-US" sz="1600" dirty="0"/>
+                        <a:t>초상화 출력 </a:t>
+                      </a:r>
+                      <a:r>
+                        <a:rPr lang="en-US" altLang="ko-KR" sz="1600" dirty="0"/>
+                        <a:t>UI 1</a:t>
+                      </a:r>
+                      <a:endParaRPr lang="ko-KR" altLang="en-US" sz="1600" dirty="0"/>
+                    </a:p>
+                  </a:txBody>
+                  <a:tcPr anchor="ctr">
+                    <a:solidFill>
+                      <a:schemeClr val="bg1"/>
+                    </a:solidFill>
+                  </a:tcPr>
+                </a:tc>
+                <a:extLst>
+                  <a:ext uri="{0D108BD9-81ED-4DB2-BD59-A6C34878D82A}">
+                    <a16:rowId xmlns:a16="http://schemas.microsoft.com/office/drawing/2014/main" val="2284623317"/>
+                  </a:ext>
+                </a:extLst>
+              </a:tr>
+              <a:tr h="345832">
+                <a:tc>
+                  <a:txBody>
+                    <a:bodyPr/>
+                    <a:lstStyle/>
+                    <a:p>
+                      <a:pPr algn="ctr" latinLnBrk="1"/>
+                      <a:r>
+                        <a:rPr lang="ko-KR" altLang="en-US" sz="1600" dirty="0"/>
+                        <a:t>②</a:t>
+                      </a:r>
+                    </a:p>
+                  </a:txBody>
+                  <a:tcPr anchor="ctr">
+                    <a:solidFill>
+                      <a:schemeClr val="bg1"/>
+                    </a:solidFill>
+                  </a:tcPr>
+                </a:tc>
+                <a:tc>
+                  <a:txBody>
+                    <a:bodyPr/>
+                    <a:lstStyle/>
+                    <a:p>
+                      <a:pPr algn="ctr" latinLnBrk="1"/>
+                      <a:r>
+                        <a:rPr lang="ko-KR" altLang="en-US" sz="1600" i="0" dirty="0">
+                          <a:solidFill>
+                            <a:schemeClr val="tx1"/>
+                          </a:solidFill>
+                        </a:rPr>
+                        <a:t>초상화 출력 </a:t>
+                      </a:r>
+                      <a:r>
+                        <a:rPr lang="en-US" altLang="ko-KR" sz="1600" i="0" dirty="0">
+                          <a:solidFill>
+                            <a:schemeClr val="tx1"/>
+                          </a:solidFill>
+                        </a:rPr>
+                        <a:t>UI 2</a:t>
+                      </a:r>
+                      <a:endParaRPr lang="ko-KR" altLang="en-US" sz="1600" i="0" dirty="0">
+                        <a:solidFill>
+                          <a:schemeClr val="tx1"/>
+                        </a:solidFill>
+                      </a:endParaRPr>
+                    </a:p>
+                  </a:txBody>
+                  <a:tcPr anchor="ctr">
+                    <a:solidFill>
+                      <a:schemeClr val="bg1"/>
+                    </a:solidFill>
+                  </a:tcPr>
+                </a:tc>
+                <a:extLst>
+                  <a:ext uri="{0D108BD9-81ED-4DB2-BD59-A6C34878D82A}">
+                    <a16:rowId xmlns:a16="http://schemas.microsoft.com/office/drawing/2014/main" val="3473698866"/>
+                  </a:ext>
+                </a:extLst>
+              </a:tr>
+              <a:tr h="345832">
+                <a:tc>
+                  <a:txBody>
+                    <a:bodyPr/>
+                    <a:lstStyle/>
+                    <a:p>
+                      <a:pPr algn="ctr" latinLnBrk="1"/>
+                      <a:r>
+                        <a:rPr lang="ko-KR" altLang="en-US" sz="1600" dirty="0"/>
+                        <a:t>③</a:t>
+                      </a:r>
+                    </a:p>
+                  </a:txBody>
+                  <a:tcPr anchor="ctr">
+                    <a:solidFill>
+                      <a:schemeClr val="bg1"/>
+                    </a:solidFill>
+                  </a:tcPr>
+                </a:tc>
+                <a:tc>
+                  <a:txBody>
+                    <a:bodyPr/>
+                    <a:lstStyle/>
+                    <a:p>
+                      <a:pPr algn="ctr" latinLnBrk="1"/>
+                      <a:r>
+                        <a:rPr lang="ko-KR" altLang="en-US" sz="1600" i="0" dirty="0">
+                          <a:solidFill>
+                            <a:schemeClr val="tx1"/>
+                          </a:solidFill>
+                        </a:rPr>
+                        <a:t>대화박스</a:t>
+                      </a:r>
+                    </a:p>
+                  </a:txBody>
+                  <a:tcPr anchor="ctr">
+                    <a:solidFill>
+                      <a:schemeClr val="bg1"/>
+                    </a:solidFill>
+                  </a:tcPr>
+                </a:tc>
+                <a:extLst>
+                  <a:ext uri="{0D108BD9-81ED-4DB2-BD59-A6C34878D82A}">
+                    <a16:rowId xmlns:a16="http://schemas.microsoft.com/office/drawing/2014/main" val="1387162518"/>
+                  </a:ext>
+                </a:extLst>
+              </a:tr>
+              <a:tr h="345832">
+                <a:tc>
+                  <a:txBody>
+                    <a:bodyPr/>
+                    <a:lstStyle/>
+                    <a:p>
+                      <a:pPr algn="ctr" latinLnBrk="1"/>
+                      <a:endParaRPr lang="ko-KR" altLang="en-US" sz="1600" dirty="0"/>
+                    </a:p>
+                  </a:txBody>
+                  <a:tcPr anchor="ctr">
+                    <a:solidFill>
+                      <a:schemeClr val="bg1"/>
+                    </a:solidFill>
+                  </a:tcPr>
+                </a:tc>
+                <a:tc>
+                  <a:txBody>
+                    <a:bodyPr/>
+                    <a:lstStyle/>
+                    <a:p>
+                      <a:pPr marL="0" marR="0" lvl="0" indent="0" algn="ctr" defTabSz="1320759" rtl="0" eaLnBrk="1" fontAlgn="auto" latinLnBrk="1" hangingPunct="1">
+                        <a:lnSpc>
+                          <a:spcPct val="100000"/>
+                        </a:lnSpc>
+                        <a:spcBef>
+                          <a:spcPts val="0"/>
+                        </a:spcBef>
+                        <a:spcAft>
+                          <a:spcPts val="0"/>
+                        </a:spcAft>
+                        <a:buClrTx/>
+                        <a:buSzTx/>
+                        <a:buFontTx/>
+                        <a:buNone/>
+                        <a:tabLst/>
+                        <a:defRPr/>
+                      </a:pPr>
+                      <a:endParaRPr lang="en-US" altLang="ko-KR" sz="1600" i="0" dirty="0">
+                        <a:solidFill>
+                          <a:schemeClr val="tx1"/>
+                        </a:solidFill>
+                      </a:endParaRPr>
+                    </a:p>
+                  </a:txBody>
+                  <a:tcPr anchor="ctr">
+                    <a:solidFill>
+                      <a:schemeClr val="bg1"/>
+                    </a:solidFill>
+                  </a:tcPr>
+                </a:tc>
+                <a:extLst>
+                  <a:ext uri="{0D108BD9-81ED-4DB2-BD59-A6C34878D82A}">
+                    <a16:rowId xmlns:a16="http://schemas.microsoft.com/office/drawing/2014/main" val="277991780"/>
+                  </a:ext>
+                </a:extLst>
+              </a:tr>
+              <a:tr h="345832">
+                <a:tc>
+                  <a:txBody>
+                    <a:bodyPr/>
+                    <a:lstStyle/>
+                    <a:p>
+                      <a:pPr algn="ctr" latinLnBrk="1"/>
+                      <a:endParaRPr lang="ko-KR" altLang="en-US" sz="1600" dirty="0"/>
+                    </a:p>
+                  </a:txBody>
+                  <a:tcPr anchor="ctr">
+                    <a:solidFill>
+                      <a:schemeClr val="bg1"/>
+                    </a:solidFill>
+                  </a:tcPr>
+                </a:tc>
+                <a:tc>
+                  <a:txBody>
+                    <a:bodyPr/>
+                    <a:lstStyle/>
+                    <a:p>
+                      <a:pPr algn="ctr" latinLnBrk="1"/>
+                      <a:endParaRPr lang="en-US" altLang="ko-KR" sz="1600" i="0" dirty="0">
+                        <a:solidFill>
+                          <a:schemeClr val="tx1"/>
+                        </a:solidFill>
+                      </a:endParaRPr>
+                    </a:p>
+                  </a:txBody>
+                  <a:tcPr anchor="ctr">
+                    <a:solidFill>
+                      <a:schemeClr val="bg1"/>
+                    </a:solidFill>
+                  </a:tcPr>
+                </a:tc>
+                <a:extLst>
+                  <a:ext uri="{0D108BD9-81ED-4DB2-BD59-A6C34878D82A}">
+                    <a16:rowId xmlns:a16="http://schemas.microsoft.com/office/drawing/2014/main" val="2894574746"/>
+                  </a:ext>
+                </a:extLst>
+              </a:tr>
+            </a:tbl>
+          </a:graphicData>
+        </a:graphic>
+      </p:graphicFrame>
+      <p:sp>
+        <p:nvSpPr>
+          <p:cNvPr id="70" name="직사각형 69">
+            <a:extLst>
+              <a:ext uri="{FF2B5EF4-FFF2-40B4-BE49-F238E27FC236}">
+                <a16:creationId xmlns:a16="http://schemas.microsoft.com/office/drawing/2014/main" id="{4F47ECB6-DA18-4D3F-838C-6769CDB15F9E}"/>
+              </a:ext>
+            </a:extLst>
+          </p:cNvPr>
+          <p:cNvSpPr/>
+          <p:nvPr/>
+        </p:nvSpPr>
+        <p:spPr>
+          <a:xfrm>
+            <a:off x="159963" y="1383794"/>
+            <a:ext cx="11520000" cy="6480000"/>
+          </a:xfrm>
+          <a:prstGeom prst="rect">
+            <a:avLst/>
+          </a:prstGeom>
+          <a:solidFill>
+            <a:schemeClr val="tx1">
+              <a:alpha val="70000"/>
+            </a:schemeClr>
+          </a:solidFill>
+          <a:ln>
+            <a:solidFill>
+              <a:schemeClr val="tx1"/>
+            </a:solidFill>
+          </a:ln>
+        </p:spPr>
+        <p:style>
+          <a:lnRef idx="2">
+            <a:schemeClr val="accent1">
+              <a:shade val="50000"/>
+            </a:schemeClr>
+          </a:lnRef>
+          <a:fillRef idx="1">
+            <a:schemeClr val="accent1"/>
+          </a:fillRef>
+          <a:effectRef idx="0">
+            <a:schemeClr val="accent1"/>
+          </a:effectRef>
+          <a:fontRef idx="minor">
+            <a:schemeClr val="lt1"/>
+          </a:fontRef>
+        </p:style>
+        <p:txBody>
+          <a:bodyPr rtlCol="0" anchor="ctr"/>
+          <a:lstStyle/>
+          <a:p>
+            <a:pPr algn="ctr"/>
+            <a:r>
+              <a:rPr lang="en-US" altLang="ko-KR" sz="3200" b="1" dirty="0">
+                <a:solidFill>
+                  <a:schemeClr val="bg2">
+                    <a:lumMod val="25000"/>
+                  </a:schemeClr>
+                </a:solidFill>
+              </a:rPr>
+              <a:t>Game Screen</a:t>
+            </a:r>
+            <a:endParaRPr lang="ko-KR" altLang="en-US" sz="3200" b="1" dirty="0">
+              <a:solidFill>
+                <a:schemeClr val="bg2">
+                  <a:lumMod val="25000"/>
+                </a:schemeClr>
+              </a:solidFill>
+            </a:endParaRPr>
+          </a:p>
+        </p:txBody>
+      </p:sp>
+      <p:sp>
+        <p:nvSpPr>
+          <p:cNvPr id="2" name="직사각형 1">
+            <a:extLst>
+              <a:ext uri="{FF2B5EF4-FFF2-40B4-BE49-F238E27FC236}">
+                <a16:creationId xmlns:a16="http://schemas.microsoft.com/office/drawing/2014/main" id="{1CB0D959-90B4-4EB3-8A4F-03501640A7A5}"/>
+              </a:ext>
+            </a:extLst>
+          </p:cNvPr>
+          <p:cNvSpPr/>
+          <p:nvPr/>
+        </p:nvSpPr>
+        <p:spPr>
+          <a:xfrm>
+            <a:off x="519963" y="5690847"/>
+            <a:ext cx="10800000" cy="1800000"/>
+          </a:xfrm>
+          <a:prstGeom prst="rect">
+            <a:avLst/>
+          </a:prstGeom>
+        </p:spPr>
+        <p:style>
+          <a:lnRef idx="2">
+            <a:schemeClr val="accent1">
+              <a:shade val="50000"/>
+            </a:schemeClr>
+          </a:lnRef>
+          <a:fillRef idx="1">
+            <a:schemeClr val="accent1"/>
+          </a:fillRef>
+          <a:effectRef idx="0">
+            <a:schemeClr val="accent1"/>
+          </a:effectRef>
+          <a:fontRef idx="minor">
+            <a:schemeClr val="lt1"/>
+          </a:fontRef>
+        </p:style>
+        <p:txBody>
+          <a:bodyPr rtlCol="0" anchor="ctr"/>
+          <a:lstStyle/>
+          <a:p>
+            <a:pPr algn="ctr"/>
+            <a:endParaRPr lang="ko-KR" altLang="en-US" dirty="0"/>
+          </a:p>
+        </p:txBody>
+      </p:sp>
+      <p:sp>
+        <p:nvSpPr>
+          <p:cNvPr id="75" name="육각형 74">
+            <a:extLst>
+              <a:ext uri="{FF2B5EF4-FFF2-40B4-BE49-F238E27FC236}">
+                <a16:creationId xmlns:a16="http://schemas.microsoft.com/office/drawing/2014/main" id="{FE096415-08C4-4937-A90C-38CD98FE0ADD}"/>
+              </a:ext>
+            </a:extLst>
+          </p:cNvPr>
+          <p:cNvSpPr>
+            <a:spLocks noChangeAspect="1"/>
+          </p:cNvSpPr>
+          <p:nvPr/>
+        </p:nvSpPr>
+        <p:spPr>
+          <a:xfrm>
+            <a:off x="519963" y="4346773"/>
+            <a:ext cx="1440000" cy="1152000"/>
+          </a:xfrm>
+          <a:prstGeom prst="hexagon">
+            <a:avLst/>
+          </a:prstGeom>
+          <a:ln>
+            <a:noFill/>
+          </a:ln>
+        </p:spPr>
+        <p:style>
+          <a:lnRef idx="2">
+            <a:schemeClr val="accent1">
+              <a:shade val="50000"/>
+            </a:schemeClr>
+          </a:lnRef>
+          <a:fillRef idx="1">
+            <a:schemeClr val="accent1"/>
+          </a:fillRef>
+          <a:effectRef idx="0">
+            <a:schemeClr val="accent1"/>
+          </a:effectRef>
+          <a:fontRef idx="minor">
+            <a:schemeClr val="lt1"/>
+          </a:fontRef>
+        </p:style>
+        <p:txBody>
+          <a:bodyPr rtlCol="0" anchor="ctr"/>
+          <a:lstStyle/>
+          <a:p>
+            <a:pPr algn="ctr"/>
+            <a:endParaRPr lang="ko-KR" altLang="en-US" sz="1400"/>
+          </a:p>
+        </p:txBody>
+      </p:sp>
+      <p:sp>
+        <p:nvSpPr>
+          <p:cNvPr id="76" name="육각형 75">
+            <a:extLst>
+              <a:ext uri="{FF2B5EF4-FFF2-40B4-BE49-F238E27FC236}">
+                <a16:creationId xmlns:a16="http://schemas.microsoft.com/office/drawing/2014/main" id="{B5571CDC-7EB1-4125-8811-6E78F06DC1D3}"/>
+              </a:ext>
+            </a:extLst>
+          </p:cNvPr>
+          <p:cNvSpPr/>
+          <p:nvPr/>
+        </p:nvSpPr>
+        <p:spPr>
+          <a:xfrm>
+            <a:off x="557747" y="4377000"/>
+            <a:ext cx="1364432" cy="1091546"/>
+          </a:xfrm>
+          <a:prstGeom prst="hexagon">
+            <a:avLst/>
+          </a:prstGeom>
+          <a:solidFill>
+            <a:schemeClr val="tx1"/>
+          </a:solidFill>
+          <a:ln>
+            <a:noFill/>
+          </a:ln>
+        </p:spPr>
+        <p:style>
+          <a:lnRef idx="2">
+            <a:schemeClr val="accent1">
+              <a:shade val="50000"/>
+            </a:schemeClr>
+          </a:lnRef>
+          <a:fillRef idx="1">
+            <a:schemeClr val="accent1"/>
+          </a:fillRef>
+          <a:effectRef idx="0">
+            <a:schemeClr val="accent1"/>
+          </a:effectRef>
+          <a:fontRef idx="minor">
+            <a:schemeClr val="lt1"/>
+          </a:fontRef>
+        </p:style>
+        <p:txBody>
+          <a:bodyPr rtlCol="0" anchor="ctr"/>
+          <a:lstStyle/>
+          <a:p>
+            <a:pPr algn="ctr"/>
+            <a:r>
+              <a:rPr lang="ko-KR" altLang="en-US" sz="1600" b="1" dirty="0">
+                <a:solidFill>
+                  <a:srgbClr val="FF0000"/>
+                </a:solidFill>
+              </a:rPr>
+              <a:t>①</a:t>
+            </a:r>
+          </a:p>
+        </p:txBody>
+      </p:sp>
+      <p:sp>
+        <p:nvSpPr>
+          <p:cNvPr id="77" name="육각형 76">
+            <a:extLst>
+              <a:ext uri="{FF2B5EF4-FFF2-40B4-BE49-F238E27FC236}">
+                <a16:creationId xmlns:a16="http://schemas.microsoft.com/office/drawing/2014/main" id="{AE3B2BAC-B504-41F0-8441-E5152D4DB8B9}"/>
+              </a:ext>
+            </a:extLst>
+          </p:cNvPr>
+          <p:cNvSpPr>
+            <a:spLocks noChangeAspect="1"/>
+          </p:cNvSpPr>
+          <p:nvPr/>
+        </p:nvSpPr>
+        <p:spPr>
+          <a:xfrm>
+            <a:off x="9879963" y="4346773"/>
+            <a:ext cx="1440000" cy="1152000"/>
+          </a:xfrm>
+          <a:prstGeom prst="hexagon">
+            <a:avLst/>
+          </a:prstGeom>
+          <a:ln>
+            <a:noFill/>
+          </a:ln>
+        </p:spPr>
+        <p:style>
+          <a:lnRef idx="2">
+            <a:schemeClr val="accent1">
+              <a:shade val="50000"/>
+            </a:schemeClr>
+          </a:lnRef>
+          <a:fillRef idx="1">
+            <a:schemeClr val="accent1"/>
+          </a:fillRef>
+          <a:effectRef idx="0">
+            <a:schemeClr val="accent1"/>
+          </a:effectRef>
+          <a:fontRef idx="minor">
+            <a:schemeClr val="lt1"/>
+          </a:fontRef>
+        </p:style>
+        <p:txBody>
+          <a:bodyPr rtlCol="0" anchor="ctr"/>
+          <a:lstStyle/>
+          <a:p>
+            <a:pPr algn="ctr"/>
+            <a:endParaRPr lang="ko-KR" altLang="en-US" sz="1400"/>
+          </a:p>
+        </p:txBody>
+      </p:sp>
+      <p:sp>
+        <p:nvSpPr>
+          <p:cNvPr id="78" name="육각형 77">
+            <a:extLst>
+              <a:ext uri="{FF2B5EF4-FFF2-40B4-BE49-F238E27FC236}">
+                <a16:creationId xmlns:a16="http://schemas.microsoft.com/office/drawing/2014/main" id="{E06ACFC9-8800-4250-AD7C-C500FD8ED362}"/>
+              </a:ext>
+            </a:extLst>
+          </p:cNvPr>
+          <p:cNvSpPr/>
+          <p:nvPr/>
+        </p:nvSpPr>
+        <p:spPr>
+          <a:xfrm>
+            <a:off x="9917747" y="4377000"/>
+            <a:ext cx="1364432" cy="1091546"/>
+          </a:xfrm>
+          <a:prstGeom prst="hexagon">
+            <a:avLst/>
+          </a:prstGeom>
+          <a:solidFill>
+            <a:schemeClr val="tx1"/>
+          </a:solidFill>
+          <a:ln>
+            <a:noFill/>
+          </a:ln>
+        </p:spPr>
+        <p:style>
+          <a:lnRef idx="2">
+            <a:schemeClr val="accent1">
+              <a:shade val="50000"/>
+            </a:schemeClr>
+          </a:lnRef>
+          <a:fillRef idx="1">
+            <a:schemeClr val="accent1"/>
+          </a:fillRef>
+          <a:effectRef idx="0">
+            <a:schemeClr val="accent1"/>
+          </a:effectRef>
+          <a:fontRef idx="minor">
+            <a:schemeClr val="lt1"/>
+          </a:fontRef>
+        </p:style>
+        <p:txBody>
+          <a:bodyPr rtlCol="0" anchor="ctr"/>
+          <a:lstStyle/>
+          <a:p>
+            <a:pPr algn="ctr"/>
+            <a:r>
+              <a:rPr lang="ko-KR" altLang="en-US" sz="1600" b="1" dirty="0">
+                <a:solidFill>
+                  <a:srgbClr val="FF0000"/>
+                </a:solidFill>
+              </a:rPr>
+              <a:t>②</a:t>
+            </a:r>
+            <a:endParaRPr lang="ko-KR" altLang="en-US" sz="1400" b="1" dirty="0">
+              <a:solidFill>
+                <a:srgbClr val="FF0000"/>
+              </a:solidFill>
+            </a:endParaRPr>
+          </a:p>
+        </p:txBody>
+      </p:sp>
+      <p:sp>
+        <p:nvSpPr>
+          <p:cNvPr id="79" name="직사각형 78">
+            <a:extLst>
+              <a:ext uri="{FF2B5EF4-FFF2-40B4-BE49-F238E27FC236}">
+                <a16:creationId xmlns:a16="http://schemas.microsoft.com/office/drawing/2014/main" id="{57E5E67E-8FC4-42C8-9A76-3CEAD6E3051F}"/>
+              </a:ext>
+            </a:extLst>
+          </p:cNvPr>
+          <p:cNvSpPr/>
+          <p:nvPr/>
+        </p:nvSpPr>
+        <p:spPr>
+          <a:xfrm>
+            <a:off x="11829964" y="3617319"/>
+            <a:ext cx="2539999" cy="2012950"/>
+          </a:xfrm>
+          <a:prstGeom prst="rect">
+            <a:avLst/>
+          </a:prstGeom>
+          <a:solidFill>
+            <a:schemeClr val="bg1">
+              <a:alpha val="20000"/>
+            </a:schemeClr>
+          </a:solidFill>
+          <a:ln>
+            <a:solidFill>
+              <a:schemeClr val="bg1"/>
+            </a:solidFill>
+          </a:ln>
+        </p:spPr>
+        <p:style>
+          <a:lnRef idx="2">
+            <a:schemeClr val="accent1">
+              <a:shade val="50000"/>
+            </a:schemeClr>
+          </a:lnRef>
+          <a:fillRef idx="1">
+            <a:schemeClr val="accent1"/>
+          </a:fillRef>
+          <a:effectRef idx="0">
+            <a:schemeClr val="accent1"/>
+          </a:effectRef>
+          <a:fontRef idx="minor">
+            <a:schemeClr val="lt1"/>
+          </a:fontRef>
+        </p:style>
+        <p:txBody>
+          <a:bodyPr rtlCol="0" anchor="ctr"/>
+          <a:lstStyle/>
+          <a:p>
+            <a:pPr algn="ctr"/>
+            <a:endParaRPr lang="ko-KR" altLang="en-US" dirty="0"/>
+          </a:p>
+        </p:txBody>
+      </p:sp>
+      <p:grpSp>
+        <p:nvGrpSpPr>
+          <p:cNvPr id="83" name="그룹 82">
+            <a:extLst>
+              <a:ext uri="{FF2B5EF4-FFF2-40B4-BE49-F238E27FC236}">
+                <a16:creationId xmlns:a16="http://schemas.microsoft.com/office/drawing/2014/main" id="{2870EDBF-90D8-4FE4-BEB7-43E1FA09D9CF}"/>
+              </a:ext>
+            </a:extLst>
+          </p:cNvPr>
+          <p:cNvGrpSpPr/>
+          <p:nvPr/>
+        </p:nvGrpSpPr>
+        <p:grpSpPr>
+          <a:xfrm>
+            <a:off x="11829964" y="3819843"/>
+            <a:ext cx="2499518" cy="1697184"/>
+            <a:chOff x="101600" y="1909794"/>
+            <a:chExt cx="2499518" cy="1697184"/>
+          </a:xfrm>
+        </p:grpSpPr>
+        <p:sp>
+          <p:nvSpPr>
+            <p:cNvPr id="84" name="직사각형 83">
+              <a:extLst>
+                <a:ext uri="{FF2B5EF4-FFF2-40B4-BE49-F238E27FC236}">
+                  <a16:creationId xmlns:a16="http://schemas.microsoft.com/office/drawing/2014/main" id="{9095EBDE-7CE0-4E09-8D54-DAF9A80D8E88}"/>
+                </a:ext>
+              </a:extLst>
+            </p:cNvPr>
+            <p:cNvSpPr/>
+            <p:nvPr/>
+          </p:nvSpPr>
+          <p:spPr>
+            <a:xfrm>
+              <a:off x="651600" y="2180112"/>
+              <a:ext cx="1440000" cy="1152000"/>
+            </a:xfrm>
+            <a:prstGeom prst="rect">
+              <a:avLst/>
+            </a:prstGeom>
+            <a:noFill/>
+            <a:ln>
+              <a:solidFill>
+                <a:schemeClr val="tx1"/>
+              </a:solidFill>
+            </a:ln>
+          </p:spPr>
+          <p:style>
+            <a:lnRef idx="2">
+              <a:schemeClr val="accent1">
+                <a:shade val="50000"/>
+              </a:schemeClr>
+            </a:lnRef>
+            <a:fillRef idx="1">
+              <a:schemeClr val="accent1"/>
+            </a:fillRef>
+            <a:effectRef idx="0">
+              <a:schemeClr val="accent1"/>
+            </a:effectRef>
+            <a:fontRef idx="minor">
+              <a:schemeClr val="lt1"/>
+            </a:fontRef>
+          </p:style>
+          <p:txBody>
+            <a:bodyPr rtlCol="0" anchor="ctr"/>
+            <a:lstStyle/>
+            <a:p>
+              <a:pPr algn="ctr"/>
+              <a:endParaRPr lang="ko-KR" altLang="en-US" dirty="0"/>
+            </a:p>
+          </p:txBody>
+        </p:sp>
+        <p:sp>
+          <p:nvSpPr>
+            <p:cNvPr id="85" name="육각형 84">
+              <a:extLst>
+                <a:ext uri="{FF2B5EF4-FFF2-40B4-BE49-F238E27FC236}">
+                  <a16:creationId xmlns:a16="http://schemas.microsoft.com/office/drawing/2014/main" id="{C7D6531C-3D59-4D2A-8A0C-AE059F8882C6}"/>
+                </a:ext>
+              </a:extLst>
+            </p:cNvPr>
+            <p:cNvSpPr>
+              <a:spLocks noChangeAspect="1"/>
+            </p:cNvSpPr>
+            <p:nvPr/>
+          </p:nvSpPr>
+          <p:spPr>
+            <a:xfrm>
+              <a:off x="651600" y="2180112"/>
+              <a:ext cx="1440000" cy="1152000"/>
+            </a:xfrm>
+            <a:prstGeom prst="hexagon">
+              <a:avLst/>
+            </a:prstGeom>
+            <a:ln>
+              <a:noFill/>
+            </a:ln>
+          </p:spPr>
+          <p:style>
+            <a:lnRef idx="2">
+              <a:schemeClr val="accent1">
+                <a:shade val="50000"/>
+              </a:schemeClr>
+            </a:lnRef>
+            <a:fillRef idx="1">
+              <a:schemeClr val="accent1"/>
+            </a:fillRef>
+            <a:effectRef idx="0">
+              <a:schemeClr val="accent1"/>
+            </a:effectRef>
+            <a:fontRef idx="minor">
+              <a:schemeClr val="lt1"/>
+            </a:fontRef>
+          </p:style>
+          <p:txBody>
+            <a:bodyPr rtlCol="0" anchor="ctr"/>
+            <a:lstStyle/>
+            <a:p>
+              <a:pPr algn="ctr"/>
+              <a:endParaRPr lang="ko-KR" altLang="en-US" sz="1400"/>
+            </a:p>
+          </p:txBody>
+        </p:sp>
+        <p:sp>
+          <p:nvSpPr>
+            <p:cNvPr id="86" name="왼쪽 대괄호 85">
+              <a:extLst>
+                <a:ext uri="{FF2B5EF4-FFF2-40B4-BE49-F238E27FC236}">
+                  <a16:creationId xmlns:a16="http://schemas.microsoft.com/office/drawing/2014/main" id="{2E1AC0CF-59A7-4547-903E-9EDBE210FCC1}"/>
+                </a:ext>
+              </a:extLst>
+            </p:cNvPr>
+            <p:cNvSpPr/>
+            <p:nvPr/>
+          </p:nvSpPr>
+          <p:spPr>
+            <a:xfrm>
+              <a:off x="552450" y="2180112"/>
+              <a:ext cx="99150" cy="1152000"/>
+            </a:xfrm>
+            <a:prstGeom prst="leftBracket">
+              <a:avLst>
+                <a:gd name="adj" fmla="val 530295"/>
+              </a:avLst>
+            </a:prstGeom>
+          </p:spPr>
+          <p:style>
+            <a:lnRef idx="1">
+              <a:schemeClr val="dk1"/>
+            </a:lnRef>
+            <a:fillRef idx="0">
+              <a:schemeClr val="dk1"/>
+            </a:fillRef>
+            <a:effectRef idx="0">
+              <a:schemeClr val="dk1"/>
+            </a:effectRef>
+            <a:fontRef idx="minor">
+              <a:schemeClr val="tx1"/>
+            </a:fontRef>
+          </p:style>
+          <p:txBody>
+            <a:bodyPr rtlCol="0" anchor="ctr"/>
+            <a:lstStyle/>
+            <a:p>
+              <a:pPr algn="ctr"/>
+              <a:endParaRPr lang="ko-KR" altLang="en-US"/>
+            </a:p>
+          </p:txBody>
+        </p:sp>
+        <p:sp>
+          <p:nvSpPr>
+            <p:cNvPr id="87" name="왼쪽 대괄호 86">
+              <a:extLst>
+                <a:ext uri="{FF2B5EF4-FFF2-40B4-BE49-F238E27FC236}">
+                  <a16:creationId xmlns:a16="http://schemas.microsoft.com/office/drawing/2014/main" id="{FDC56159-D4FB-4E65-85AE-2415ACC53EB2}"/>
+                </a:ext>
+              </a:extLst>
+            </p:cNvPr>
+            <p:cNvSpPr/>
+            <p:nvPr/>
+          </p:nvSpPr>
+          <p:spPr>
+            <a:xfrm rot="5400000">
+              <a:off x="1322025" y="1410537"/>
+              <a:ext cx="99150" cy="1440000"/>
+            </a:xfrm>
+            <a:prstGeom prst="leftBracket">
+              <a:avLst>
+                <a:gd name="adj" fmla="val 703214"/>
+              </a:avLst>
+            </a:prstGeom>
+          </p:spPr>
+          <p:style>
+            <a:lnRef idx="1">
+              <a:schemeClr val="dk1"/>
+            </a:lnRef>
+            <a:fillRef idx="0">
+              <a:schemeClr val="dk1"/>
+            </a:fillRef>
+            <a:effectRef idx="0">
+              <a:schemeClr val="dk1"/>
+            </a:effectRef>
+            <a:fontRef idx="minor">
+              <a:schemeClr val="tx1"/>
+            </a:fontRef>
+          </p:style>
+          <p:txBody>
+            <a:bodyPr rtlCol="0" anchor="ctr"/>
+            <a:lstStyle/>
+            <a:p>
+              <a:pPr algn="ctr"/>
+              <a:endParaRPr lang="ko-KR" altLang="en-US"/>
+            </a:p>
+          </p:txBody>
+        </p:sp>
+        <p:sp>
+          <p:nvSpPr>
+            <p:cNvPr id="90" name="TextBox 89">
+              <a:extLst>
+                <a:ext uri="{FF2B5EF4-FFF2-40B4-BE49-F238E27FC236}">
+                  <a16:creationId xmlns:a16="http://schemas.microsoft.com/office/drawing/2014/main" id="{3C67C785-6A57-49D5-B496-273D6E3CE004}"/>
+                </a:ext>
+              </a:extLst>
+            </p:cNvPr>
+            <p:cNvSpPr txBox="1"/>
+            <p:nvPr/>
+          </p:nvSpPr>
+          <p:spPr>
+            <a:xfrm>
+              <a:off x="838200" y="1909794"/>
+              <a:ext cx="1066800" cy="230832"/>
+            </a:xfrm>
+            <a:prstGeom prst="rect">
+              <a:avLst/>
+            </a:prstGeom>
+            <a:noFill/>
+          </p:spPr>
+          <p:txBody>
+            <a:bodyPr wrap="square" rtlCol="0">
+              <a:spAutoFit/>
+            </a:bodyPr>
+            <a:lstStyle/>
+            <a:p>
+              <a:pPr algn="ctr"/>
+              <a:r>
+                <a:rPr lang="en-US" altLang="ko-KR" sz="900" dirty="0"/>
+                <a:t>240</a:t>
+              </a:r>
+            </a:p>
+          </p:txBody>
+        </p:sp>
+        <p:sp>
+          <p:nvSpPr>
+            <p:cNvPr id="91" name="TextBox 90">
+              <a:extLst>
+                <a:ext uri="{FF2B5EF4-FFF2-40B4-BE49-F238E27FC236}">
+                  <a16:creationId xmlns:a16="http://schemas.microsoft.com/office/drawing/2014/main" id="{DD33BF1A-12C7-4D4B-92B6-A2BE806C147B}"/>
+                </a:ext>
+              </a:extLst>
+            </p:cNvPr>
+            <p:cNvSpPr txBox="1"/>
+            <p:nvPr/>
+          </p:nvSpPr>
+          <p:spPr>
+            <a:xfrm>
+              <a:off x="101600" y="2640696"/>
+              <a:ext cx="587375" cy="230832"/>
+            </a:xfrm>
+            <a:prstGeom prst="rect">
+              <a:avLst/>
+            </a:prstGeom>
+            <a:noFill/>
+          </p:spPr>
+          <p:txBody>
+            <a:bodyPr wrap="square" rtlCol="0">
+              <a:spAutoFit/>
+            </a:bodyPr>
+            <a:lstStyle/>
+            <a:p>
+              <a:pPr algn="ctr"/>
+              <a:r>
+                <a:rPr lang="en-US" altLang="ko-KR" sz="900" dirty="0"/>
+                <a:t>192</a:t>
+              </a:r>
+            </a:p>
+          </p:txBody>
+        </p:sp>
+        <p:sp>
+          <p:nvSpPr>
+            <p:cNvPr id="98" name="왼쪽 대괄호 97">
+              <a:extLst>
+                <a:ext uri="{FF2B5EF4-FFF2-40B4-BE49-F238E27FC236}">
+                  <a16:creationId xmlns:a16="http://schemas.microsoft.com/office/drawing/2014/main" id="{F2C56C16-E434-40B5-8F63-305082EA41EF}"/>
+                </a:ext>
+              </a:extLst>
+            </p:cNvPr>
+            <p:cNvSpPr/>
+            <p:nvPr/>
+          </p:nvSpPr>
+          <p:spPr>
+            <a:xfrm rot="16200000" flipV="1">
+              <a:off x="1898025" y="3237688"/>
+              <a:ext cx="99150" cy="288000"/>
+            </a:xfrm>
+            <a:prstGeom prst="leftBracket">
+              <a:avLst>
+                <a:gd name="adj" fmla="val 703214"/>
+              </a:avLst>
+            </a:prstGeom>
+          </p:spPr>
+          <p:style>
+            <a:lnRef idx="1">
+              <a:schemeClr val="dk1"/>
+            </a:lnRef>
+            <a:fillRef idx="0">
+              <a:schemeClr val="dk1"/>
+            </a:fillRef>
+            <a:effectRef idx="0">
+              <a:schemeClr val="dk1"/>
+            </a:effectRef>
+            <a:fontRef idx="minor">
+              <a:schemeClr val="tx1"/>
+            </a:fontRef>
+          </p:style>
+          <p:txBody>
+            <a:bodyPr rtlCol="0" anchor="ctr"/>
+            <a:lstStyle/>
+            <a:p>
+              <a:pPr algn="ctr"/>
+              <a:endParaRPr lang="ko-KR" altLang="en-US"/>
+            </a:p>
+          </p:txBody>
+        </p:sp>
+        <p:sp>
+          <p:nvSpPr>
+            <p:cNvPr id="100" name="TextBox 99">
+              <a:extLst>
+                <a:ext uri="{FF2B5EF4-FFF2-40B4-BE49-F238E27FC236}">
+                  <a16:creationId xmlns:a16="http://schemas.microsoft.com/office/drawing/2014/main" id="{A9CECAEA-6AA5-413C-A46A-CA2B66E5EC26}"/>
+                </a:ext>
+              </a:extLst>
+            </p:cNvPr>
+            <p:cNvSpPr txBox="1"/>
+            <p:nvPr/>
+          </p:nvSpPr>
+          <p:spPr>
+            <a:xfrm>
+              <a:off x="1414200" y="3376146"/>
+              <a:ext cx="1066800" cy="230832"/>
+            </a:xfrm>
+            <a:prstGeom prst="rect">
+              <a:avLst/>
+            </a:prstGeom>
+            <a:noFill/>
+          </p:spPr>
+          <p:txBody>
+            <a:bodyPr wrap="square" rtlCol="0">
+              <a:spAutoFit/>
+            </a:bodyPr>
+            <a:lstStyle/>
+            <a:p>
+              <a:pPr algn="ctr"/>
+              <a:r>
+                <a:rPr lang="en-US" altLang="ko-KR" sz="900" dirty="0"/>
+                <a:t>48</a:t>
+              </a:r>
+            </a:p>
+          </p:txBody>
+        </p:sp>
+        <p:sp>
+          <p:nvSpPr>
+            <p:cNvPr id="103" name="왼쪽 대괄호 102">
+              <a:extLst>
+                <a:ext uri="{FF2B5EF4-FFF2-40B4-BE49-F238E27FC236}">
+                  <a16:creationId xmlns:a16="http://schemas.microsoft.com/office/drawing/2014/main" id="{D2868C65-1BB1-407A-B24B-0FB0D34A1181}"/>
+                </a:ext>
+              </a:extLst>
+            </p:cNvPr>
+            <p:cNvSpPr/>
+            <p:nvPr/>
+          </p:nvSpPr>
+          <p:spPr>
+            <a:xfrm flipH="1">
+              <a:off x="2097019" y="2755111"/>
+              <a:ext cx="99150" cy="576999"/>
+            </a:xfrm>
+            <a:prstGeom prst="leftBracket">
+              <a:avLst>
+                <a:gd name="adj" fmla="val 530295"/>
+              </a:avLst>
+            </a:prstGeom>
+          </p:spPr>
+          <p:style>
+            <a:lnRef idx="1">
+              <a:schemeClr val="dk1"/>
+            </a:lnRef>
+            <a:fillRef idx="0">
+              <a:schemeClr val="dk1"/>
+            </a:fillRef>
+            <a:effectRef idx="0">
+              <a:schemeClr val="dk1"/>
+            </a:effectRef>
+            <a:fontRef idx="minor">
+              <a:schemeClr val="tx1"/>
+            </a:fontRef>
+          </p:style>
+          <p:txBody>
+            <a:bodyPr rtlCol="0" anchor="ctr"/>
+            <a:lstStyle/>
+            <a:p>
+              <a:pPr algn="ctr"/>
+              <a:endParaRPr lang="ko-KR" altLang="en-US"/>
+            </a:p>
+          </p:txBody>
+        </p:sp>
+        <p:sp>
+          <p:nvSpPr>
+            <p:cNvPr id="104" name="TextBox 103">
+              <a:extLst>
+                <a:ext uri="{FF2B5EF4-FFF2-40B4-BE49-F238E27FC236}">
+                  <a16:creationId xmlns:a16="http://schemas.microsoft.com/office/drawing/2014/main" id="{7F37CDAD-0640-4EDD-B6D1-B553C0EDA277}"/>
+                </a:ext>
+              </a:extLst>
+            </p:cNvPr>
+            <p:cNvSpPr txBox="1"/>
+            <p:nvPr/>
+          </p:nvSpPr>
+          <p:spPr>
+            <a:xfrm>
+              <a:off x="2013743" y="2925567"/>
+              <a:ext cx="587375" cy="230832"/>
+            </a:xfrm>
+            <a:prstGeom prst="rect">
+              <a:avLst/>
+            </a:prstGeom>
+            <a:noFill/>
+          </p:spPr>
+          <p:txBody>
+            <a:bodyPr wrap="square" rtlCol="0">
+              <a:spAutoFit/>
+            </a:bodyPr>
+            <a:lstStyle/>
+            <a:p>
+              <a:pPr algn="ctr"/>
+              <a:r>
+                <a:rPr lang="en-US" altLang="ko-KR" sz="900" dirty="0"/>
+                <a:t>96</a:t>
+              </a:r>
+            </a:p>
+          </p:txBody>
+        </p:sp>
+      </p:grpSp>
+      <p:sp>
+        <p:nvSpPr>
+          <p:cNvPr id="105" name="직사각형 104">
+            <a:extLst>
+              <a:ext uri="{FF2B5EF4-FFF2-40B4-BE49-F238E27FC236}">
+                <a16:creationId xmlns:a16="http://schemas.microsoft.com/office/drawing/2014/main" id="{736049F3-6162-4EF7-9BAA-D637066D043D}"/>
+              </a:ext>
+            </a:extLst>
+          </p:cNvPr>
+          <p:cNvSpPr/>
+          <p:nvPr/>
+        </p:nvSpPr>
+        <p:spPr>
+          <a:xfrm>
+            <a:off x="227547" y="7988299"/>
+            <a:ext cx="10800000" cy="1800000"/>
+          </a:xfrm>
+          <a:prstGeom prst="rect">
+            <a:avLst/>
+          </a:prstGeom>
+        </p:spPr>
+        <p:style>
+          <a:lnRef idx="2">
+            <a:schemeClr val="accent1">
+              <a:shade val="50000"/>
+            </a:schemeClr>
+          </a:lnRef>
+          <a:fillRef idx="1">
+            <a:schemeClr val="accent1"/>
+          </a:fillRef>
+          <a:effectRef idx="0">
+            <a:schemeClr val="accent1"/>
+          </a:effectRef>
+          <a:fontRef idx="minor">
+            <a:schemeClr val="lt1"/>
+          </a:fontRef>
+        </p:style>
+        <p:txBody>
+          <a:bodyPr rtlCol="0" anchor="ctr"/>
+          <a:lstStyle/>
+          <a:p>
+            <a:pPr algn="ctr"/>
+            <a:endParaRPr lang="ko-KR" altLang="en-US" dirty="0"/>
+          </a:p>
+        </p:txBody>
+      </p:sp>
+      <p:sp>
+        <p:nvSpPr>
+          <p:cNvPr id="107" name="직사각형 106">
+            <a:extLst>
+              <a:ext uri="{FF2B5EF4-FFF2-40B4-BE49-F238E27FC236}">
+                <a16:creationId xmlns:a16="http://schemas.microsoft.com/office/drawing/2014/main" id="{0A251D63-6729-4CAD-A61F-7ECE7D3F1140}"/>
+              </a:ext>
+            </a:extLst>
+          </p:cNvPr>
+          <p:cNvSpPr/>
+          <p:nvPr/>
+        </p:nvSpPr>
+        <p:spPr>
+          <a:xfrm>
+            <a:off x="609963" y="5780847"/>
+            <a:ext cx="10620000" cy="1620000"/>
+          </a:xfrm>
+          <a:prstGeom prst="rect">
+            <a:avLst/>
+          </a:prstGeom>
+          <a:solidFill>
+            <a:schemeClr val="tx1"/>
+          </a:solidFill>
+        </p:spPr>
+        <p:style>
+          <a:lnRef idx="2">
+            <a:schemeClr val="accent1">
+              <a:shade val="50000"/>
+            </a:schemeClr>
+          </a:lnRef>
+          <a:fillRef idx="1">
+            <a:schemeClr val="accent1"/>
+          </a:fillRef>
+          <a:effectRef idx="0">
+            <a:schemeClr val="accent1"/>
+          </a:effectRef>
+          <a:fontRef idx="minor">
+            <a:schemeClr val="lt1"/>
+          </a:fontRef>
+        </p:style>
+        <p:txBody>
+          <a:bodyPr rtlCol="0" anchor="ctr"/>
+          <a:lstStyle/>
+          <a:p>
+            <a:pPr algn="ctr"/>
+            <a:r>
+              <a:rPr lang="ko-KR" altLang="en-US" b="1" dirty="0">
+                <a:solidFill>
+                  <a:srgbClr val="FF0000"/>
+                </a:solidFill>
+              </a:rPr>
+              <a:t>③</a:t>
+            </a:r>
+          </a:p>
+        </p:txBody>
+      </p:sp>
+      <p:sp>
+        <p:nvSpPr>
+          <p:cNvPr id="108" name="왼쪽 대괄호 107">
+            <a:extLst>
+              <a:ext uri="{FF2B5EF4-FFF2-40B4-BE49-F238E27FC236}">
+                <a16:creationId xmlns:a16="http://schemas.microsoft.com/office/drawing/2014/main" id="{389F003B-1D5B-4228-80BE-06B4F95C4A34}"/>
+              </a:ext>
+            </a:extLst>
+          </p:cNvPr>
+          <p:cNvSpPr/>
+          <p:nvPr/>
+        </p:nvSpPr>
+        <p:spPr>
+          <a:xfrm rot="5400000">
+            <a:off x="5512130" y="4272884"/>
+            <a:ext cx="230831" cy="10799999"/>
+          </a:xfrm>
+          <a:prstGeom prst="leftBracket">
+            <a:avLst>
+              <a:gd name="adj" fmla="val 703214"/>
+            </a:avLst>
+          </a:prstGeom>
+        </p:spPr>
+        <p:style>
+          <a:lnRef idx="1">
+            <a:schemeClr val="dk1"/>
+          </a:lnRef>
+          <a:fillRef idx="0">
+            <a:schemeClr val="dk1"/>
+          </a:fillRef>
+          <a:effectRef idx="0">
+            <a:schemeClr val="dk1"/>
+          </a:effectRef>
+          <a:fontRef idx="minor">
+            <a:schemeClr val="tx1"/>
+          </a:fontRef>
+        </p:style>
+        <p:txBody>
+          <a:bodyPr rtlCol="0" anchor="ctr"/>
+          <a:lstStyle/>
+          <a:p>
+            <a:pPr algn="ctr"/>
+            <a:endParaRPr lang="ko-KR" altLang="en-US"/>
+          </a:p>
+        </p:txBody>
+      </p:sp>
+      <p:sp>
+        <p:nvSpPr>
+          <p:cNvPr id="110" name="TextBox 109">
+            <a:extLst>
+              <a:ext uri="{FF2B5EF4-FFF2-40B4-BE49-F238E27FC236}">
+                <a16:creationId xmlns:a16="http://schemas.microsoft.com/office/drawing/2014/main" id="{450982ED-E8D4-4C9B-8F71-644F09415E69}"/>
+              </a:ext>
+            </a:extLst>
+          </p:cNvPr>
+          <p:cNvSpPr txBox="1"/>
+          <p:nvPr/>
+        </p:nvSpPr>
+        <p:spPr>
+          <a:xfrm>
+            <a:off x="5056363" y="9295858"/>
+            <a:ext cx="1066800" cy="261610"/>
+          </a:xfrm>
+          <a:prstGeom prst="rect">
+            <a:avLst/>
+          </a:prstGeom>
+          <a:noFill/>
+        </p:spPr>
+        <p:txBody>
+          <a:bodyPr wrap="square" rtlCol="0">
+            <a:spAutoFit/>
+          </a:bodyPr>
+          <a:lstStyle/>
+          <a:p>
+            <a:pPr algn="ctr"/>
+            <a:r>
+              <a:rPr lang="en-US" altLang="ko-KR" sz="1100" b="1" dirty="0"/>
+              <a:t>1800</a:t>
+            </a:r>
+            <a:endParaRPr lang="en-US" altLang="ko-KR" sz="900" b="1" dirty="0"/>
+          </a:p>
+        </p:txBody>
+      </p:sp>
+      <p:sp>
+        <p:nvSpPr>
+          <p:cNvPr id="111" name="왼쪽 대괄호 110">
+            <a:extLst>
+              <a:ext uri="{FF2B5EF4-FFF2-40B4-BE49-F238E27FC236}">
+                <a16:creationId xmlns:a16="http://schemas.microsoft.com/office/drawing/2014/main" id="{557540AC-6BA8-4520-9312-F42CB6497BE7}"/>
+              </a:ext>
+            </a:extLst>
+          </p:cNvPr>
+          <p:cNvSpPr/>
+          <p:nvPr/>
+        </p:nvSpPr>
+        <p:spPr>
+          <a:xfrm rot="10800000">
+            <a:off x="11027545" y="8020245"/>
+            <a:ext cx="322218" cy="1768053"/>
+          </a:xfrm>
+          <a:prstGeom prst="leftBracket">
+            <a:avLst>
+              <a:gd name="adj" fmla="val 703214"/>
+            </a:avLst>
+          </a:prstGeom>
+        </p:spPr>
+        <p:style>
+          <a:lnRef idx="1">
+            <a:schemeClr val="dk1"/>
+          </a:lnRef>
+          <a:fillRef idx="0">
+            <a:schemeClr val="dk1"/>
+          </a:fillRef>
+          <a:effectRef idx="0">
+            <a:schemeClr val="dk1"/>
+          </a:effectRef>
+          <a:fontRef idx="minor">
+            <a:schemeClr val="tx1"/>
+          </a:fontRef>
+        </p:style>
+        <p:txBody>
+          <a:bodyPr rtlCol="0" anchor="ctr"/>
+          <a:lstStyle/>
+          <a:p>
+            <a:pPr algn="ctr"/>
+            <a:endParaRPr lang="ko-KR" altLang="en-US"/>
+          </a:p>
+        </p:txBody>
+      </p:sp>
+      <p:sp>
+        <p:nvSpPr>
+          <p:cNvPr id="112" name="TextBox 111">
+            <a:extLst>
+              <a:ext uri="{FF2B5EF4-FFF2-40B4-BE49-F238E27FC236}">
+                <a16:creationId xmlns:a16="http://schemas.microsoft.com/office/drawing/2014/main" id="{D8E98F61-208F-4E60-B65A-9B8B3ADF6EB5}"/>
+              </a:ext>
+            </a:extLst>
+          </p:cNvPr>
+          <p:cNvSpPr txBox="1"/>
+          <p:nvPr/>
+        </p:nvSpPr>
+        <p:spPr>
+          <a:xfrm>
+            <a:off x="11027543" y="8773467"/>
+            <a:ext cx="1066800" cy="261610"/>
+          </a:xfrm>
+          <a:prstGeom prst="rect">
+            <a:avLst/>
+          </a:prstGeom>
+          <a:noFill/>
+        </p:spPr>
+        <p:txBody>
+          <a:bodyPr wrap="square" rtlCol="0">
+            <a:spAutoFit/>
+          </a:bodyPr>
+          <a:lstStyle/>
+          <a:p>
+            <a:pPr algn="ctr"/>
+            <a:r>
+              <a:rPr lang="en-US" altLang="ko-KR" sz="1100" b="1" dirty="0"/>
+              <a:t>300</a:t>
+            </a:r>
+            <a:endParaRPr lang="en-US" altLang="ko-KR" sz="900" b="1" dirty="0"/>
+          </a:p>
+        </p:txBody>
+      </p:sp>
+    </p:spTree>
+    <p:extLst>
+      <p:ext uri="{BB962C8B-B14F-4D97-AF65-F5344CB8AC3E}">
+        <p14:creationId xmlns:p14="http://schemas.microsoft.com/office/powerpoint/2010/main" val="2526617739"/>
+      </p:ext>
+    </p:extLst>
+  </p:cSld>
+  <p:clrMapOvr>
+    <a:masterClrMapping/>
+  </p:clrMapOvr>
+</p:sld>
+</file>
+
+<file path=ppt/slides/slide7.xml><?xml version="1.0" encoding="utf-8"?>
+<p:sld xmlns:a="http://schemas.openxmlformats.org/drawingml/2006/main" xmlns:r="http://schemas.openxmlformats.org/officeDocument/2006/relationships" xmlns:p="http://schemas.openxmlformats.org/presentationml/2006/main">
+  <p:cSld>
+    <p:spTree>
+      <p:nvGrpSpPr>
+        <p:cNvPr id="1" name=""/>
+        <p:cNvGrpSpPr/>
+        <p:nvPr/>
+      </p:nvGrpSpPr>
+      <p:grpSpPr>
+        <a:xfrm>
+          <a:off x="0" y="0"/>
+          <a:ext cx="0" cy="0"/>
+          <a:chOff x="0" y="0"/>
+          <a:chExt cx="0" cy="0"/>
+        </a:xfrm>
+      </p:grpSpPr>
+      <p:sp>
+        <p:nvSpPr>
           <p:cNvPr id="4" name="직사각형 3">
             <a:extLst>
               <a:ext uri="{FF2B5EF4-FFF2-40B4-BE49-F238E27FC236}">
@@ -9804,7 +11580,7 @@
 </p:sld>
 </file>
 
-<file path=ppt/slides/slide7.xml><?xml version="1.0" encoding="utf-8"?>
+<file path=ppt/slides/slide8.xml><?xml version="1.0" encoding="utf-8"?>
 <p:sld xmlns:a="http://schemas.openxmlformats.org/drawingml/2006/main" xmlns:r="http://schemas.openxmlformats.org/officeDocument/2006/relationships" xmlns:p="http://schemas.openxmlformats.org/presentationml/2006/main">
   <p:cSld>
     <p:spTree>

</xml_diff>